<commit_message>
Version before substantial changes on the paper
</commit_message>
<xml_diff>
--- a/img/PCAD.pptx
+++ b/img/PCAD.pptx
@@ -261,7 +261,7 @@
           <a:p>
             <a:fld id="{C82DCF77-BEA7-6C42-B65C-E5761D0F8E88}" type="datetimeFigureOut">
               <a:rPr lang="de-DE" smtClean="0"/>
-              <a:t>30.06.19</a:t>
+              <a:t>04.07.19</a:t>
             </a:fld>
             <a:endParaRPr lang="de-DE"/>
           </a:p>
@@ -459,7 +459,7 @@
           <a:p>
             <a:fld id="{C82DCF77-BEA7-6C42-B65C-E5761D0F8E88}" type="datetimeFigureOut">
               <a:rPr lang="de-DE" smtClean="0"/>
-              <a:t>30.06.19</a:t>
+              <a:t>04.07.19</a:t>
             </a:fld>
             <a:endParaRPr lang="de-DE"/>
           </a:p>
@@ -667,7 +667,7 @@
           <a:p>
             <a:fld id="{C82DCF77-BEA7-6C42-B65C-E5761D0F8E88}" type="datetimeFigureOut">
               <a:rPr lang="de-DE" smtClean="0"/>
-              <a:t>30.06.19</a:t>
+              <a:t>04.07.19</a:t>
             </a:fld>
             <a:endParaRPr lang="de-DE"/>
           </a:p>
@@ -865,7 +865,7 @@
           <a:p>
             <a:fld id="{C82DCF77-BEA7-6C42-B65C-E5761D0F8E88}" type="datetimeFigureOut">
               <a:rPr lang="de-DE" smtClean="0"/>
-              <a:t>30.06.19</a:t>
+              <a:t>04.07.19</a:t>
             </a:fld>
             <a:endParaRPr lang="de-DE"/>
           </a:p>
@@ -1140,7 +1140,7 @@
           <a:p>
             <a:fld id="{C82DCF77-BEA7-6C42-B65C-E5761D0F8E88}" type="datetimeFigureOut">
               <a:rPr lang="de-DE" smtClean="0"/>
-              <a:t>30.06.19</a:t>
+              <a:t>04.07.19</a:t>
             </a:fld>
             <a:endParaRPr lang="de-DE"/>
           </a:p>
@@ -1405,7 +1405,7 @@
           <a:p>
             <a:fld id="{C82DCF77-BEA7-6C42-B65C-E5761D0F8E88}" type="datetimeFigureOut">
               <a:rPr lang="de-DE" smtClean="0"/>
-              <a:t>30.06.19</a:t>
+              <a:t>04.07.19</a:t>
             </a:fld>
             <a:endParaRPr lang="de-DE"/>
           </a:p>
@@ -1817,7 +1817,7 @@
           <a:p>
             <a:fld id="{C82DCF77-BEA7-6C42-B65C-E5761D0F8E88}" type="datetimeFigureOut">
               <a:rPr lang="de-DE" smtClean="0"/>
-              <a:t>30.06.19</a:t>
+              <a:t>04.07.19</a:t>
             </a:fld>
             <a:endParaRPr lang="de-DE"/>
           </a:p>
@@ -1958,7 +1958,7 @@
           <a:p>
             <a:fld id="{C82DCF77-BEA7-6C42-B65C-E5761D0F8E88}" type="datetimeFigureOut">
               <a:rPr lang="de-DE" smtClean="0"/>
-              <a:t>30.06.19</a:t>
+              <a:t>04.07.19</a:t>
             </a:fld>
             <a:endParaRPr lang="de-DE"/>
           </a:p>
@@ -2071,7 +2071,7 @@
           <a:p>
             <a:fld id="{C82DCF77-BEA7-6C42-B65C-E5761D0F8E88}" type="datetimeFigureOut">
               <a:rPr lang="de-DE" smtClean="0"/>
-              <a:t>30.06.19</a:t>
+              <a:t>04.07.19</a:t>
             </a:fld>
             <a:endParaRPr lang="de-DE"/>
           </a:p>
@@ -2382,7 +2382,7 @@
           <a:p>
             <a:fld id="{C82DCF77-BEA7-6C42-B65C-E5761D0F8E88}" type="datetimeFigureOut">
               <a:rPr lang="de-DE" smtClean="0"/>
-              <a:t>30.06.19</a:t>
+              <a:t>04.07.19</a:t>
             </a:fld>
             <a:endParaRPr lang="de-DE"/>
           </a:p>
@@ -2670,7 +2670,7 @@
           <a:p>
             <a:fld id="{C82DCF77-BEA7-6C42-B65C-E5761D0F8E88}" type="datetimeFigureOut">
               <a:rPr lang="de-DE" smtClean="0"/>
-              <a:t>30.06.19</a:t>
+              <a:t>04.07.19</a:t>
             </a:fld>
             <a:endParaRPr lang="de-DE"/>
           </a:p>
@@ -2911,7 +2911,7 @@
           <a:p>
             <a:fld id="{C82DCF77-BEA7-6C42-B65C-E5761D0F8E88}" type="datetimeFigureOut">
               <a:rPr lang="de-DE" smtClean="0"/>
-              <a:t>30.06.19</a:t>
+              <a:t>04.07.19</a:t>
             </a:fld>
             <a:endParaRPr lang="de-DE"/>
           </a:p>
@@ -6533,7 +6533,7 @@
                     <a:schemeClr val="tx1"/>
                   </a:solidFill>
                 </a:rPr>
-                <a:t>PCAD</a:t>
+                <a:t>3D</a:t>
               </a:r>
               <a:br>
                 <a:rPr lang="de-DE" sz="2000" dirty="0">
@@ -6548,7 +6548,7 @@
                     <a:schemeClr val="tx1"/>
                   </a:solidFill>
                 </a:rPr>
-                <a:t>File</a:t>
+                <a:t>Model</a:t>
               </a:r>
             </a:p>
           </p:txBody>
@@ -6995,16 +6995,15 @@
                     <a:schemeClr val="tx1"/>
                   </a:solidFill>
                 </a:rPr>
-                <a:t>export</a:t>
+                <a:t>add</a:t>
               </a:r>
-              <a:endParaRPr lang="de-DE" sz="1600" dirty="0">
-                <a:solidFill>
-                  <a:schemeClr val="tx1"/>
-                </a:solidFill>
-              </a:endParaRPr>
-            </a:p>
-            <a:p>
-              <a:pPr algn="ctr"/>
+              <a:br>
+                <a:rPr lang="de-DE" sz="1600" dirty="0">
+                  <a:solidFill>
+                    <a:schemeClr val="tx1"/>
+                  </a:solidFill>
+                </a:rPr>
+              </a:br>
               <a:r>
                 <a:rPr lang="de-DE" sz="1600" dirty="0" err="1">
                   <a:solidFill>
@@ -7635,12 +7634,12 @@
             <a:p>
               <a:pPr algn="ctr"/>
               <a:r>
-                <a:rPr lang="de-DE" sz="1600" dirty="0">
+                <a:rPr lang="de-DE" sz="1600">
                   <a:solidFill>
                     <a:schemeClr val="tx1"/>
                   </a:solidFill>
                 </a:rPr>
-                <a:t>3d </a:t>
+                <a:t>3D </a:t>
               </a:r>
               <a:r>
                 <a:rPr lang="de-DE" sz="1600" dirty="0" err="1">

</xml_diff>